<commit_message>
added changes to README
</commit_message>
<xml_diff>
--- a/Sharon-Chebet Project.pptx
+++ b/Sharon-Chebet Project.pptx
@@ -3060,7 +3060,7 @@
         </p:nvSpPr>
         <p:spPr>
           <a:xfrm>
-            <a:off x="1058779" y="751305"/>
+            <a:off x="1058778" y="1329081"/>
             <a:ext cx="9469120" cy="1645919"/>
           </a:xfrm>
         </p:spPr>
@@ -3086,7 +3086,7 @@
         </p:nvSpPr>
         <p:spPr>
           <a:xfrm>
-            <a:off x="1524426" y="2975000"/>
+            <a:off x="1524425" y="3961320"/>
             <a:ext cx="8537825" cy="523220"/>
           </a:xfrm>
           <a:prstGeom prst="rect">
@@ -3108,48 +3108,6 @@
               </a:rPr>
               <a:t>Identifying and Addressing Water Well Issues in Tanzania</a:t>
             </a:r>
-          </a:p>
-        </p:txBody>
-      </p:sp>
-      <p:sp>
-        <p:nvSpPr>
-          <p:cNvPr id="4" name="TextBox 3"/>
-          <p:cNvSpPr txBox="1"/>
-          <p:nvPr/>
-        </p:nvSpPr>
-        <p:spPr>
-          <a:xfrm>
-            <a:off x="1781280" y="4460787"/>
-            <a:ext cx="4973053" cy="369332"/>
-          </a:xfrm>
-          <a:prstGeom prst="rect">
-            <a:avLst/>
-          </a:prstGeom>
-          <a:noFill/>
-        </p:spPr>
-        <p:txBody>
-          <a:bodyPr wrap="square" rtlCol="0">
-            <a:spAutoFit/>
-          </a:bodyPr>
-          <a:lstStyle/>
-          <a:p>
-            <a:r>
-              <a:rPr lang="en-US" dirty="0" smtClean="0">
-                <a:solidFill>
-                  <a:srgbClr val="7030A0"/>
-                </a:solidFill>
-              </a:rPr>
-              <a:t>Presented by : </a:t>
-            </a:r>
-            <a:r>
-              <a:rPr lang="en-US" dirty="0" smtClean="0"/>
-              <a:t>Sharon </a:t>
-            </a:r>
-            <a:r>
-              <a:rPr lang="en-US" dirty="0" err="1" smtClean="0"/>
-              <a:t>chebet</a:t>
-            </a:r>
-            <a:endParaRPr lang="en-US" dirty="0"/>
           </a:p>
         </p:txBody>
       </p:sp>
@@ -5024,7 +4982,6 @@
               <a:rPr lang="en-US" sz="4000" dirty="0"/>
               <a:t>Evaluating Model Performance with ROC Curves</a:t>
             </a:r>
-            <a:endParaRPr lang="en-US" sz="4000" dirty="0"/>
           </a:p>
         </p:txBody>
       </p:sp>

</xml_diff>